<commit_message>
snapshot of ontologies, updated PPT.
</commit_message>
<xml_diff>
--- a/StatusReports/Phase2/ANSWER-ASKE-TA1-08052019.pptx
+++ b/StatusReports/Phase2/ANSWER-ASKE-TA1-08052019.pptx
@@ -375,7 +375,7 @@
           <a:p>
             <a:fld id="{FCBF77B6-06AB-43A3-89A4-8CD1677993D0}" type="datetimeFigureOut">
               <a:rPr lang="en-CA" smtClean="0"/>
-              <a:t>2019-08-07</a:t>
+              <a:t>2019-08-08</a:t>
             </a:fld>
             <a:endParaRPr lang="en-CA"/>
           </a:p>
@@ -17964,6 +17964,12 @@
           <a:prstGeom prst="ellipse">
             <a:avLst/>
           </a:prstGeom>
+          <a:solidFill>
+            <a:schemeClr val="accent1">
+              <a:lumMod val="60000"/>
+              <a:lumOff val="40000"/>
+            </a:schemeClr>
+          </a:solidFill>
         </p:spPr>
         <p:style>
           <a:lnRef idx="2">
@@ -18428,6 +18434,12 @@
           <a:prstGeom prst="ellipse">
             <a:avLst/>
           </a:prstGeom>
+          <a:solidFill>
+            <a:schemeClr val="accent1">
+              <a:lumMod val="60000"/>
+              <a:lumOff val="40000"/>
+            </a:schemeClr>
+          </a:solidFill>
         </p:spPr>
         <p:style>
           <a:lnRef idx="2">

</xml_diff>